<commit_message>
Lending Club Case Study Presentation check-in
</commit_message>
<xml_diff>
--- a/LendingClubCaseStudy_ML61_RameshVelivela.pptx
+++ b/LendingClubCaseStudy_ML61_RameshVelivela.pptx
@@ -332,7 +332,7 @@
           <a:p>
             <a:fld id="{8669AFDC-7658-4951-B0FF-52DFF2A93C0A}" type="datetimeFigureOut">
               <a:rPr lang="en-US" smtClean="0"/>
-              <a:t>3/5/2024</a:t>
+              <a:t>3/6/2024</a:t>
             </a:fld>
             <a:endParaRPr lang="en-US"/>
           </a:p>
@@ -497,7 +497,7 @@
           <a:p>
             <a:fld id="{3ABD2D7A-D230-4F91-BD59-0A39C2703BA8}" type="datetimeFigureOut">
               <a:rPr lang="en-US" smtClean="0"/>
-              <a:t>3/5/2024</a:t>
+              <a:t>3/6/2024</a:t>
             </a:fld>
             <a:endParaRPr lang="en-US"/>
           </a:p>
@@ -1257,7 +1257,7 @@
           <a:p>
             <a:fld id="{7AD97A02-24D5-43C3-BCFC-2CCD133A63C6}" type="datetime1">
               <a:rPr lang="en-US" smtClean="0"/>
-              <a:t>3/5/2024</a:t>
+              <a:t>3/6/2024</a:t>
             </a:fld>
             <a:endParaRPr/>
           </a:p>
@@ -1463,7 +1463,7 @@
           <a:p>
             <a:fld id="{8E828B75-D0FE-410F-9D3C-1FBB4DBD19F8}" type="datetime1">
               <a:rPr lang="en-US" smtClean="0"/>
-              <a:t>3/5/2024</a:t>
+              <a:t>3/6/2024</a:t>
             </a:fld>
             <a:endParaRPr/>
           </a:p>
@@ -1707,7 +1707,7 @@
           <a:p>
             <a:fld id="{7606ADDC-D9FE-4653-BB32-8BF980D9D27E}" type="datetime1">
               <a:rPr lang="en-US" smtClean="0"/>
-              <a:t>3/5/2024</a:t>
+              <a:t>3/6/2024</a:t>
             </a:fld>
             <a:endParaRPr/>
           </a:p>
@@ -2124,7 +2124,7 @@
           <a:p>
             <a:fld id="{96ABDA1B-F647-43B6-8190-ACA8A6BC3644}" type="datetime1">
               <a:rPr lang="en-US" smtClean="0"/>
-              <a:t>3/5/2024</a:t>
+              <a:t>3/6/2024</a:t>
             </a:fld>
             <a:endParaRPr/>
           </a:p>
@@ -2485,7 +2485,7 @@
           <a:p>
             <a:fld id="{9C210371-43A4-480F-AC11-608DB6AB636D}" type="datetime1">
               <a:rPr lang="en-US" smtClean="0"/>
-              <a:t>3/5/2024</a:t>
+              <a:t>3/6/2024</a:t>
             </a:fld>
             <a:endParaRPr/>
           </a:p>
@@ -3010,7 +3010,7 @@
           <a:p>
             <a:fld id="{713E1D6E-B6A0-4434-A686-41B7082EEF57}" type="datetime1">
               <a:rPr lang="en-US" smtClean="0"/>
-              <a:t>3/5/2024</a:t>
+              <a:t>3/6/2024</a:t>
             </a:fld>
             <a:endParaRPr/>
           </a:p>
@@ -3214,7 +3214,7 @@
           <a:p>
             <a:fld id="{D5C7393C-128D-4005-83B8-5A5CFE5AF574}" type="datetime1">
               <a:rPr lang="en-US" smtClean="0"/>
-              <a:t>3/5/2024</a:t>
+              <a:t>3/6/2024</a:t>
             </a:fld>
             <a:endParaRPr/>
           </a:p>
@@ -3363,7 +3363,7 @@
           <a:p>
             <a:fld id="{F91E9E23-BA87-4E8C-BB06-6ED2338609FD}" type="datetime1">
               <a:rPr lang="en-US" smtClean="0"/>
-              <a:t>3/5/2024</a:t>
+              <a:t>3/6/2024</a:t>
             </a:fld>
             <a:endParaRPr/>
           </a:p>
@@ -3677,7 +3677,7 @@
           <a:p>
             <a:fld id="{83DB8005-CD04-450F-B291-CEDE5AAE7ABD}" type="datetime1">
               <a:rPr lang="en-US" smtClean="0"/>
-              <a:t>3/5/2024</a:t>
+              <a:t>3/6/2024</a:t>
             </a:fld>
             <a:endParaRPr/>
           </a:p>
@@ -4228,7 +4228,7 @@
           <a:p>
             <a:fld id="{405706A2-89B5-49D5-B333-7DD1AACF2CB5}" type="datetime1">
               <a:rPr lang="en-US" smtClean="0"/>
-              <a:t>3/5/2024</a:t>
+              <a:t>3/6/2024</a:t>
             </a:fld>
             <a:endParaRPr lang="en-US"/>
           </a:p>
@@ -5309,13 +5309,13 @@
   <p:clrMapOvr>
     <a:masterClrMapping/>
   </p:clrMapOvr>
-  <mc:AlternateContent xmlns:mc="http://schemas.openxmlformats.org/markup-compatibility/2006">
-    <mc:Choice xmlns:p14="http://schemas.microsoft.com/office/powerpoint/2010/main" Requires="p14">
+  <mc:AlternateContent xmlns:mc="http://schemas.openxmlformats.org/markup-compatibility/2006" xmlns:p14="http://schemas.microsoft.com/office/powerpoint/2010/main">
+    <mc:Choice Requires="p14">
       <p:transition spd="med" p14:dur="700">
         <p:fade/>
       </p:transition>
     </mc:Choice>
-    <mc:Fallback>
+    <mc:Fallback xmlns="">
       <p:transition spd="med">
         <p:fade/>
       </p:transition>
@@ -6025,13 +6025,13 @@
   <p:clrMapOvr>
     <a:masterClrMapping/>
   </p:clrMapOvr>
-  <mc:AlternateContent xmlns:mc="http://schemas.openxmlformats.org/markup-compatibility/2006">
-    <mc:Choice xmlns:p14="http://schemas.microsoft.com/office/powerpoint/2010/main" Requires="p14">
+  <mc:AlternateContent xmlns:mc="http://schemas.openxmlformats.org/markup-compatibility/2006" xmlns:p14="http://schemas.microsoft.com/office/powerpoint/2010/main">
+    <mc:Choice Requires="p14">
       <p:transition spd="med" p14:dur="700">
         <p:fade/>
       </p:transition>
     </mc:Choice>
-    <mc:Fallback>
+    <mc:Fallback xmlns="">
       <p:transition spd="med">
         <p:fade/>
       </p:transition>
@@ -6626,13 +6626,13 @@
   <p:clrMapOvr>
     <a:masterClrMapping/>
   </p:clrMapOvr>
-  <mc:AlternateContent xmlns:mc="http://schemas.openxmlformats.org/markup-compatibility/2006">
-    <mc:Choice xmlns:p14="http://schemas.microsoft.com/office/powerpoint/2010/main" Requires="p14">
+  <mc:AlternateContent xmlns:mc="http://schemas.openxmlformats.org/markup-compatibility/2006" xmlns:p14="http://schemas.microsoft.com/office/powerpoint/2010/main">
+    <mc:Choice Requires="p14">
       <p:transition spd="med" p14:dur="700">
         <p:fade/>
       </p:transition>
     </mc:Choice>
-    <mc:Fallback>
+    <mc:Fallback xmlns="">
       <p:transition spd="med">
         <p:fade/>
       </p:transition>
@@ -7373,13 +7373,13 @@
   <p:clrMapOvr>
     <a:masterClrMapping/>
   </p:clrMapOvr>
-  <mc:AlternateContent xmlns:mc="http://schemas.openxmlformats.org/markup-compatibility/2006">
-    <mc:Choice xmlns:p14="http://schemas.microsoft.com/office/powerpoint/2010/main" Requires="p14">
+  <mc:AlternateContent xmlns:mc="http://schemas.openxmlformats.org/markup-compatibility/2006" xmlns:p14="http://schemas.microsoft.com/office/powerpoint/2010/main">
+    <mc:Choice Requires="p14">
       <p:transition spd="med" p14:dur="700">
         <p:fade/>
       </p:transition>
     </mc:Choice>
-    <mc:Fallback>
+    <mc:Fallback xmlns="">
       <p:transition spd="med">
         <p:fade/>
       </p:transition>
@@ -7953,13 +7953,13 @@
   <p:clrMapOvr>
     <a:masterClrMapping/>
   </p:clrMapOvr>
-  <mc:AlternateContent xmlns:mc="http://schemas.openxmlformats.org/markup-compatibility/2006">
-    <mc:Choice xmlns:p14="http://schemas.microsoft.com/office/powerpoint/2010/main" Requires="p14">
+  <mc:AlternateContent xmlns:mc="http://schemas.openxmlformats.org/markup-compatibility/2006" xmlns:p14="http://schemas.microsoft.com/office/powerpoint/2010/main">
+    <mc:Choice Requires="p14">
       <p:transition spd="med" p14:dur="700">
         <p:fade/>
       </p:transition>
     </mc:Choice>
-    <mc:Fallback>
+    <mc:Fallback xmlns="">
       <p:transition spd="med">
         <p:fade/>
       </p:transition>
@@ -8406,13 +8406,13 @@
   <p:clrMapOvr>
     <a:masterClrMapping/>
   </p:clrMapOvr>
-  <mc:AlternateContent xmlns:mc="http://schemas.openxmlformats.org/markup-compatibility/2006">
-    <mc:Choice xmlns:p14="http://schemas.microsoft.com/office/powerpoint/2010/main" Requires="p14">
+  <mc:AlternateContent xmlns:mc="http://schemas.openxmlformats.org/markup-compatibility/2006" xmlns:p14="http://schemas.microsoft.com/office/powerpoint/2010/main">
+    <mc:Choice Requires="p14">
       <p:transition spd="med" p14:dur="700">
         <p:fade/>
       </p:transition>
     </mc:Choice>
-    <mc:Fallback>
+    <mc:Fallback xmlns="">
       <p:transition spd="med">
         <p:fade/>
       </p:transition>
@@ -8818,13 +8818,13 @@
   <p:clrMapOvr>
     <a:masterClrMapping/>
   </p:clrMapOvr>
-  <mc:AlternateContent xmlns:mc="http://schemas.openxmlformats.org/markup-compatibility/2006">
-    <mc:Choice xmlns:p14="http://schemas.microsoft.com/office/powerpoint/2010/main" Requires="p14">
+  <mc:AlternateContent xmlns:mc="http://schemas.openxmlformats.org/markup-compatibility/2006" xmlns:p14="http://schemas.microsoft.com/office/powerpoint/2010/main">
+    <mc:Choice Requires="p14">
       <p:transition spd="med" p14:dur="700">
         <p:fade/>
       </p:transition>
     </mc:Choice>
-    <mc:Fallback>
+    <mc:Fallback xmlns="">
       <p:transition spd="med">
         <p:fade/>
       </p:transition>
@@ -9168,13 +9168,13 @@
   <p:clrMapOvr>
     <a:masterClrMapping/>
   </p:clrMapOvr>
-  <mc:AlternateContent xmlns:mc="http://schemas.openxmlformats.org/markup-compatibility/2006">
-    <mc:Choice xmlns:p14="http://schemas.microsoft.com/office/powerpoint/2010/main" Requires="p14">
+  <mc:AlternateContent xmlns:mc="http://schemas.openxmlformats.org/markup-compatibility/2006" xmlns:p14="http://schemas.microsoft.com/office/powerpoint/2010/main">
+    <mc:Choice Requires="p14">
       <p:transition spd="med" p14:dur="700">
         <p:fade/>
       </p:transition>
     </mc:Choice>
-    <mc:Fallback>
+    <mc:Fallback xmlns="">
       <p:transition spd="med">
         <p:fade/>
       </p:transition>
@@ -9802,13 +9802,13 @@
   <p:clrMapOvr>
     <a:masterClrMapping/>
   </p:clrMapOvr>
-  <mc:AlternateContent xmlns:mc="http://schemas.openxmlformats.org/markup-compatibility/2006">
-    <mc:Choice xmlns:p14="http://schemas.microsoft.com/office/powerpoint/2010/main" Requires="p14">
+  <mc:AlternateContent xmlns:mc="http://schemas.openxmlformats.org/markup-compatibility/2006" xmlns:p14="http://schemas.microsoft.com/office/powerpoint/2010/main">
+    <mc:Choice Requires="p14">
       <p:transition spd="med" p14:dur="700">
         <p:fade/>
       </p:transition>
     </mc:Choice>
-    <mc:Fallback>
+    <mc:Fallback xmlns="">
       <p:transition spd="med">
         <p:fade/>
       </p:transition>
@@ -9896,12 +9896,12 @@
         </p:spPr>
         <p:txBody>
           <a:bodyPr>
-            <a:normAutofit lnSpcReduction="10000"/>
+            <a:normAutofit/>
           </a:bodyPr>
           <a:lstStyle/>
           <a:p>
             <a:r>
-              <a:rPr lang="en-US" sz="1600" dirty="0">
+              <a:rPr lang="en-US" sz="1200" dirty="0">
                 <a:latin typeface="Tahoma" panose="020B0604030504040204" pitchFamily="34" charset="0"/>
                 <a:ea typeface="Tahoma" panose="020B0604030504040204" pitchFamily="34" charset="0"/>
                 <a:cs typeface="Tahoma" panose="020B0604030504040204" pitchFamily="34" charset="0"/>
@@ -9909,7 +9909,7 @@
               <a:t>As per the given source loan data, </a:t>
             </a:r>
             <a:r>
-              <a:rPr lang="en-US" sz="1600" b="1" dirty="0">
+              <a:rPr lang="en-US" sz="1200" b="1" dirty="0">
                 <a:latin typeface="Tahoma" panose="020B0604030504040204" pitchFamily="34" charset="0"/>
                 <a:ea typeface="Tahoma" panose="020B0604030504040204" pitchFamily="34" charset="0"/>
                 <a:cs typeface="Tahoma" panose="020B0604030504040204" pitchFamily="34" charset="0"/>
@@ -9917,7 +9917,7 @@
               <a:t>following are few factors / </a:t>
             </a:r>
             <a:r>
-              <a:rPr lang="en-US" sz="1600" b="1" dirty="0">
+              <a:rPr lang="en-US" sz="1200" b="1" dirty="0">
                 <a:solidFill>
                   <a:srgbClr val="4E78F0"/>
                 </a:solidFill>
@@ -9928,7 +9928,7 @@
               <a:t>risk indicators which conveys potential loan default scenarios</a:t>
             </a:r>
             <a:r>
-              <a:rPr lang="en-US" sz="1600" dirty="0">
+              <a:rPr lang="en-US" sz="1200" dirty="0">
                 <a:latin typeface="Tahoma" panose="020B0604030504040204" pitchFamily="34" charset="0"/>
                 <a:ea typeface="Tahoma" panose="020B0604030504040204" pitchFamily="34" charset="0"/>
                 <a:cs typeface="Tahoma" panose="020B0604030504040204" pitchFamily="34" charset="0"/>
@@ -9939,7 +9939,7 @@
           <a:p>
             <a:pPr lvl="1"/>
             <a:r>
-              <a:rPr lang="en-US" sz="1200" b="1" dirty="0">
+              <a:rPr lang="en-US" sz="1100" b="1" dirty="0">
                 <a:solidFill>
                   <a:srgbClr val="4E78F0"/>
                 </a:solidFill>
@@ -9950,7 +9950,7 @@
               <a:t>High </a:t>
             </a:r>
             <a:r>
-              <a:rPr lang="en-US" sz="1200" dirty="0">
+              <a:rPr lang="en-US" sz="1100" dirty="0">
                 <a:solidFill>
                   <a:srgbClr val="4E78F0"/>
                 </a:solidFill>
@@ -9961,7 +9961,7 @@
               <a:t>Interest Rate</a:t>
             </a:r>
             <a:r>
-              <a:rPr lang="en-US" sz="1200" dirty="0">
+              <a:rPr lang="en-US" sz="1100" dirty="0">
                 <a:latin typeface="Tahoma" panose="020B0604030504040204" pitchFamily="34" charset="0"/>
                 <a:ea typeface="Tahoma" panose="020B0604030504040204" pitchFamily="34" charset="0"/>
                 <a:cs typeface="Tahoma" panose="020B0604030504040204" pitchFamily="34" charset="0"/>
@@ -9972,7 +9972,7 @@
           <a:p>
             <a:pPr lvl="1"/>
             <a:r>
-              <a:rPr lang="en-US" sz="1200" b="1" dirty="0">
+              <a:rPr lang="en-US" sz="1100" b="1" dirty="0">
                 <a:solidFill>
                   <a:srgbClr val="4E78F0"/>
                 </a:solidFill>
@@ -9983,7 +9983,7 @@
               <a:t>High </a:t>
             </a:r>
             <a:r>
-              <a:rPr lang="en-US" sz="1200" dirty="0">
+              <a:rPr lang="en-US" sz="1100" dirty="0">
                 <a:solidFill>
                   <a:srgbClr val="4E78F0"/>
                 </a:solidFill>
@@ -9994,7 +9994,7 @@
               <a:t>Annual Income </a:t>
             </a:r>
             <a:r>
-              <a:rPr lang="en-US" sz="1200" dirty="0">
+              <a:rPr lang="en-US" sz="1100" dirty="0">
                 <a:latin typeface="Tahoma" panose="020B0604030504040204" pitchFamily="34" charset="0"/>
                 <a:ea typeface="Tahoma" panose="020B0604030504040204" pitchFamily="34" charset="0"/>
                 <a:cs typeface="Tahoma" panose="020B0604030504040204" pitchFamily="34" charset="0"/>
@@ -10005,7 +10005,7 @@
           <a:p>
             <a:pPr lvl="1"/>
             <a:r>
-              <a:rPr lang="en-US" sz="1200" b="1" dirty="0">
+              <a:rPr lang="en-US" sz="1100" b="1" dirty="0">
                 <a:solidFill>
                   <a:srgbClr val="4E78F0"/>
                 </a:solidFill>
@@ -10016,7 +10016,7 @@
               <a:t>Long </a:t>
             </a:r>
             <a:r>
-              <a:rPr lang="en-US" sz="1200" dirty="0">
+              <a:rPr lang="en-US" sz="1100" dirty="0">
                 <a:solidFill>
                   <a:srgbClr val="4E78F0"/>
                 </a:solidFill>
@@ -10027,7 +10027,7 @@
               <a:t>Term Loans </a:t>
             </a:r>
             <a:r>
-              <a:rPr lang="en-US" sz="1200" dirty="0">
+              <a:rPr lang="en-US" sz="1100" dirty="0">
                 <a:latin typeface="Tahoma" panose="020B0604030504040204" pitchFamily="34" charset="0"/>
                 <a:ea typeface="Tahoma" panose="020B0604030504040204" pitchFamily="34" charset="0"/>
                 <a:cs typeface="Tahoma" panose="020B0604030504040204" pitchFamily="34" charset="0"/>
@@ -10038,7 +10038,7 @@
           <a:p>
             <a:pPr lvl="1"/>
             <a:r>
-              <a:rPr lang="en-US" sz="1200" dirty="0">
+              <a:rPr lang="en-US" sz="1100" dirty="0">
                 <a:latin typeface="Tahoma" panose="020B0604030504040204" pitchFamily="34" charset="0"/>
                 <a:ea typeface="Tahoma" panose="020B0604030504040204" pitchFamily="34" charset="0"/>
                 <a:cs typeface="Tahoma" panose="020B0604030504040204" pitchFamily="34" charset="0"/>
@@ -10046,7 +10046,7 @@
               <a:t>Loan purpose to </a:t>
             </a:r>
             <a:r>
-              <a:rPr lang="en-US" sz="1200" b="1" dirty="0">
+              <a:rPr lang="en-US" sz="1100" b="1" dirty="0">
                 <a:solidFill>
                   <a:srgbClr val="4E78F0"/>
                 </a:solidFill>
@@ -10057,7 +10057,7 @@
               <a:t>consolidate debts</a:t>
             </a:r>
             <a:r>
-              <a:rPr lang="en-US" sz="1200" b="1" dirty="0">
+              <a:rPr lang="en-US" sz="1100" b="1" dirty="0">
                 <a:latin typeface="Tahoma" panose="020B0604030504040204" pitchFamily="34" charset="0"/>
                 <a:ea typeface="Tahoma" panose="020B0604030504040204" pitchFamily="34" charset="0"/>
                 <a:cs typeface="Tahoma" panose="020B0604030504040204" pitchFamily="34" charset="0"/>
@@ -10065,7 +10065,7 @@
               <a:t> </a:t>
             </a:r>
             <a:r>
-              <a:rPr lang="en-US" sz="1200" dirty="0">
+              <a:rPr lang="en-US" sz="1100" dirty="0">
                 <a:latin typeface="Tahoma" panose="020B0604030504040204" pitchFamily="34" charset="0"/>
                 <a:ea typeface="Tahoma" panose="020B0604030504040204" pitchFamily="34" charset="0"/>
                 <a:cs typeface="Tahoma" panose="020B0604030504040204" pitchFamily="34" charset="0"/>
@@ -10073,7 +10073,7 @@
               <a:t>and for </a:t>
             </a:r>
             <a:r>
-              <a:rPr lang="en-US" sz="1200" b="1" dirty="0">
+              <a:rPr lang="en-US" sz="1100" b="1" dirty="0">
                 <a:solidFill>
                   <a:srgbClr val="4E78F0"/>
                 </a:solidFill>
@@ -10087,7 +10087,7 @@
           <a:p>
             <a:pPr lvl="1"/>
             <a:r>
-              <a:rPr lang="en-US" sz="1200" dirty="0">
+              <a:rPr lang="en-US" sz="1100" dirty="0">
                 <a:solidFill>
                   <a:srgbClr val="4E78F0"/>
                 </a:solidFill>
@@ -10098,7 +10098,7 @@
               <a:t>Loan applications from </a:t>
             </a:r>
             <a:r>
-              <a:rPr lang="en-US" sz="1200" b="1" dirty="0">
+              <a:rPr lang="en-US" sz="1100" b="1" dirty="0">
                 <a:solidFill>
                   <a:srgbClr val="4E78F0"/>
                 </a:solidFill>
@@ -10109,7 +10109,7 @@
               <a:t>Highly </a:t>
             </a:r>
             <a:r>
-              <a:rPr lang="en-US" sz="1200" dirty="0">
+              <a:rPr lang="en-US" sz="1100" dirty="0">
                 <a:solidFill>
                   <a:srgbClr val="4E78F0"/>
                 </a:solidFill>
@@ -10120,7 +10120,7 @@
               <a:t>experienced employees </a:t>
             </a:r>
             <a:r>
-              <a:rPr lang="en-US" sz="1200" dirty="0">
+              <a:rPr lang="en-US" sz="1100" dirty="0">
                 <a:latin typeface="Tahoma" panose="020B0604030504040204" pitchFamily="34" charset="0"/>
                 <a:ea typeface="Tahoma" panose="020B0604030504040204" pitchFamily="34" charset="0"/>
                 <a:cs typeface="Tahoma" panose="020B0604030504040204" pitchFamily="34" charset="0"/>
@@ -10128,7 +10128,7 @@
               <a:t>who are taking high amounts (better to avoid to mitigate risk) and </a:t>
             </a:r>
             <a:r>
-              <a:rPr lang="en-US" sz="1200" b="1" dirty="0">
+              <a:rPr lang="en-US" sz="1100" b="1" dirty="0">
                 <a:solidFill>
                   <a:srgbClr val="4E78F0"/>
                 </a:solidFill>
@@ -10138,7 +10138,7 @@
               </a:rPr>
               <a:t>High Annual Income</a:t>
             </a:r>
-            <a:endParaRPr lang="en-US" sz="1200" dirty="0">
+            <a:endParaRPr lang="en-US" sz="1100" dirty="0">
               <a:solidFill>
                 <a:srgbClr val="4E78F0"/>
               </a:solidFill>
@@ -10149,7 +10149,7 @@
           </a:p>
           <a:p>
             <a:r>
-              <a:rPr lang="en-US" sz="1600" dirty="0">
+              <a:rPr lang="en-US" sz="1200" dirty="0">
                 <a:latin typeface="Tahoma" panose="020B0604030504040204" pitchFamily="34" charset="0"/>
                 <a:ea typeface="Tahoma" panose="020B0604030504040204" pitchFamily="34" charset="0"/>
                 <a:cs typeface="Tahoma" panose="020B0604030504040204" pitchFamily="34" charset="0"/>
@@ -10157,7 +10157,7 @@
               <a:t>In summary, </a:t>
             </a:r>
             <a:r>
-              <a:rPr lang="en-US" sz="1600" b="1" dirty="0">
+              <a:rPr lang="en-US" sz="1200" b="1" dirty="0">
                 <a:solidFill>
                   <a:srgbClr val="4E78F0"/>
                 </a:solidFill>
@@ -10168,7 +10168,7 @@
               <a:t>Annual Income</a:t>
             </a:r>
             <a:r>
-              <a:rPr lang="en-US" sz="1600" dirty="0">
+              <a:rPr lang="en-US" sz="1200" dirty="0">
                 <a:solidFill>
                   <a:srgbClr val="4E78F0"/>
                 </a:solidFill>
@@ -10179,7 +10179,7 @@
               <a:t>, </a:t>
             </a:r>
             <a:r>
-              <a:rPr lang="en-US" sz="1600" b="1" dirty="0">
+              <a:rPr lang="en-US" sz="1200" b="1" dirty="0">
                 <a:solidFill>
                   <a:srgbClr val="4E78F0"/>
                 </a:solidFill>
@@ -10190,7 +10190,7 @@
               <a:t>Home Ownership</a:t>
             </a:r>
             <a:r>
-              <a:rPr lang="en-US" sz="1600" dirty="0">
+              <a:rPr lang="en-US" sz="1200" dirty="0">
                 <a:solidFill>
                   <a:srgbClr val="4E78F0"/>
                 </a:solidFill>
@@ -10201,7 +10201,7 @@
               <a:t>, </a:t>
             </a:r>
             <a:r>
-              <a:rPr lang="en-US" sz="1600" b="1" dirty="0">
+              <a:rPr lang="en-US" sz="1200" b="1" dirty="0">
                 <a:solidFill>
                   <a:srgbClr val="4E78F0"/>
                 </a:solidFill>
@@ -10212,7 +10212,7 @@
               <a:t>Purpose of Loan</a:t>
             </a:r>
             <a:r>
-              <a:rPr lang="en-US" sz="1600" dirty="0">
+              <a:rPr lang="en-US" sz="1200" dirty="0">
                 <a:solidFill>
                   <a:srgbClr val="4E78F0"/>
                 </a:solidFill>
@@ -10223,7 +10223,7 @@
               <a:t>, </a:t>
             </a:r>
             <a:r>
-              <a:rPr lang="en-US" sz="1600" b="1" dirty="0">
+              <a:rPr lang="en-US" sz="1200" b="1" dirty="0">
                 <a:solidFill>
                   <a:srgbClr val="4E78F0"/>
                 </a:solidFill>
@@ -10234,7 +10234,7 @@
               <a:t>Loan Amount</a:t>
             </a:r>
             <a:r>
-              <a:rPr lang="en-US" sz="1600" dirty="0">
+              <a:rPr lang="en-US" sz="1200" dirty="0">
                 <a:solidFill>
                   <a:srgbClr val="4E78F0"/>
                 </a:solidFill>
@@ -10245,7 +10245,7 @@
               <a:t>, </a:t>
             </a:r>
             <a:r>
-              <a:rPr lang="en-US" sz="1600" b="1" dirty="0">
+              <a:rPr lang="en-US" sz="1200" b="1" dirty="0">
                 <a:solidFill>
                   <a:srgbClr val="4E78F0"/>
                 </a:solidFill>
@@ -10256,7 +10256,7 @@
               <a:t>Interest Rate</a:t>
             </a:r>
             <a:r>
-              <a:rPr lang="en-US" sz="1600" dirty="0">
+              <a:rPr lang="en-US" sz="1200" dirty="0">
                 <a:solidFill>
                   <a:srgbClr val="4E78F0"/>
                 </a:solidFill>
@@ -10267,7 +10267,7 @@
               <a:t>, and </a:t>
             </a:r>
             <a:r>
-              <a:rPr lang="en-US" sz="1600" b="1" dirty="0">
+              <a:rPr lang="en-US" sz="1200" b="1" dirty="0">
                 <a:solidFill>
                   <a:srgbClr val="4E78F0"/>
                 </a:solidFill>
@@ -10278,7 +10278,7 @@
               <a:t>Loan Term </a:t>
             </a:r>
             <a:r>
-              <a:rPr lang="en-US" sz="1600" dirty="0">
+              <a:rPr lang="en-US" sz="1200" dirty="0">
                 <a:latin typeface="Tahoma" panose="020B0604030504040204" pitchFamily="34" charset="0"/>
                 <a:ea typeface="Tahoma" panose="020B0604030504040204" pitchFamily="34" charset="0"/>
                 <a:cs typeface="Tahoma" panose="020B0604030504040204" pitchFamily="34" charset="0"/>
@@ -10286,7 +10286,7 @@
               <a:t>are </a:t>
             </a:r>
             <a:r>
-              <a:rPr lang="en-US" sz="1600" b="1" u="sng" dirty="0">
+              <a:rPr lang="en-US" sz="1200" b="1" u="sng" dirty="0">
                 <a:solidFill>
                   <a:srgbClr val="4E78F0"/>
                 </a:solidFill>
@@ -10297,7 +10297,7 @@
               <a:t>critical factors </a:t>
             </a:r>
             <a:r>
-              <a:rPr lang="en-US" sz="1600" dirty="0">
+              <a:rPr lang="en-US" sz="1200" dirty="0">
                 <a:latin typeface="Tahoma" panose="020B0604030504040204" pitchFamily="34" charset="0"/>
                 <a:ea typeface="Tahoma" panose="020B0604030504040204" pitchFamily="34" charset="0"/>
                 <a:cs typeface="Tahoma" panose="020B0604030504040204" pitchFamily="34" charset="0"/>
@@ -10307,7 +10307,7 @@
           </a:p>
           <a:p>
             <a:r>
-              <a:rPr lang="en-US" sz="1600" dirty="0">
+              <a:rPr lang="en-US" sz="1200" dirty="0">
                 <a:latin typeface="Tahoma" panose="020B0604030504040204" pitchFamily="34" charset="0"/>
                 <a:ea typeface="Tahoma" panose="020B0604030504040204" pitchFamily="34" charset="0"/>
                 <a:cs typeface="Tahoma" panose="020B0604030504040204" pitchFamily="34" charset="0"/>
@@ -10315,7 +10315,7 @@
               <a:t>Final recommendation as per this EDA is to consider the above set of attributes as </a:t>
             </a:r>
             <a:r>
-              <a:rPr lang="en-US" sz="1600" b="1" dirty="0">
+              <a:rPr lang="en-US" sz="1200" b="1" dirty="0">
                 <a:latin typeface="Tahoma" panose="020B0604030504040204" pitchFamily="34" charset="0"/>
                 <a:ea typeface="Tahoma" panose="020B0604030504040204" pitchFamily="34" charset="0"/>
                 <a:cs typeface="Tahoma" panose="020B0604030504040204" pitchFamily="34" charset="0"/>
@@ -10323,7 +10323,7 @@
               <a:t>driving factors (or driver variables) behind loan default</a:t>
             </a:r>
             <a:r>
-              <a:rPr lang="en-US" sz="1600" dirty="0">
+              <a:rPr lang="en-US" sz="1200" dirty="0">
                 <a:latin typeface="Tahoma" panose="020B0604030504040204" pitchFamily="34" charset="0"/>
                 <a:ea typeface="Tahoma" panose="020B0604030504040204" pitchFamily="34" charset="0"/>
                 <a:cs typeface="Tahoma" panose="020B0604030504040204" pitchFamily="34" charset="0"/>
@@ -10331,7 +10331,7 @@
               <a:t>, i.e. the variables which are </a:t>
             </a:r>
             <a:r>
-              <a:rPr lang="en-US" sz="1600" b="1" dirty="0">
+              <a:rPr lang="en-US" sz="1200" b="1" dirty="0">
                 <a:latin typeface="Tahoma" panose="020B0604030504040204" pitchFamily="34" charset="0"/>
                 <a:ea typeface="Tahoma" panose="020B0604030504040204" pitchFamily="34" charset="0"/>
                 <a:cs typeface="Tahoma" panose="020B0604030504040204" pitchFamily="34" charset="0"/>
@@ -10339,28 +10339,12 @@
               <a:t>strong indicators of default</a:t>
             </a:r>
             <a:r>
-              <a:rPr lang="en-US" sz="1600" dirty="0">
-                <a:latin typeface="Tahoma" panose="020B0604030504040204" pitchFamily="34" charset="0"/>
-                <a:ea typeface="Tahoma" panose="020B0604030504040204" pitchFamily="34" charset="0"/>
-                <a:cs typeface="Tahoma" panose="020B0604030504040204" pitchFamily="34" charset="0"/>
-              </a:rPr>
-              <a:t>.  Hence, this Lending company can refer this above during upcoming </a:t>
-            </a:r>
-            <a:r>
-              <a:rPr lang="en-US" sz="1600">
-                <a:latin typeface="Tahoma" panose="020B0604030504040204" pitchFamily="34" charset="0"/>
-                <a:ea typeface="Tahoma" panose="020B0604030504040204" pitchFamily="34" charset="0"/>
-                <a:cs typeface="Tahoma" panose="020B0604030504040204" pitchFamily="34" charset="0"/>
-              </a:rPr>
-              <a:t>loan application’s risk </a:t>
-            </a:r>
-            <a:r>
-              <a:rPr lang="en-US" sz="1600" dirty="0">
-                <a:latin typeface="Tahoma" panose="020B0604030504040204" pitchFamily="34" charset="0"/>
-                <a:ea typeface="Tahoma" panose="020B0604030504040204" pitchFamily="34" charset="0"/>
-                <a:cs typeface="Tahoma" panose="020B0604030504040204" pitchFamily="34" charset="0"/>
-              </a:rPr>
-              <a:t>assessment.</a:t>
+              <a:rPr lang="en-US" sz="1200" dirty="0">
+                <a:latin typeface="Tahoma" panose="020B0604030504040204" pitchFamily="34" charset="0"/>
+                <a:ea typeface="Tahoma" panose="020B0604030504040204" pitchFamily="34" charset="0"/>
+                <a:cs typeface="Tahoma" panose="020B0604030504040204" pitchFamily="34" charset="0"/>
+              </a:rPr>
+              <a:t>.  Hence, this Lending company can refer this above during upcoming loan application’s risk assessment.</a:t>
             </a:r>
           </a:p>
         </p:txBody>
@@ -13609,13 +13593,13 @@
   <p:clrMapOvr>
     <a:masterClrMapping/>
   </p:clrMapOvr>
-  <mc:AlternateContent xmlns:mc="http://schemas.openxmlformats.org/markup-compatibility/2006">
-    <mc:Choice xmlns:p14="http://schemas.microsoft.com/office/powerpoint/2010/main" Requires="p14">
+  <mc:AlternateContent xmlns:mc="http://schemas.openxmlformats.org/markup-compatibility/2006" xmlns:p14="http://schemas.microsoft.com/office/powerpoint/2010/main">
+    <mc:Choice Requires="p14">
       <p:transition spd="med" p14:dur="700">
         <p:fade/>
       </p:transition>
     </mc:Choice>
-    <mc:Fallback>
+    <mc:Fallback xmlns="">
       <p:transition spd="med">
         <p:fade/>
       </p:transition>
@@ -14362,13 +14346,13 @@
   <p:clrMapOvr>
     <a:masterClrMapping/>
   </p:clrMapOvr>
-  <mc:AlternateContent xmlns:mc="http://schemas.openxmlformats.org/markup-compatibility/2006">
-    <mc:Choice xmlns:p14="http://schemas.microsoft.com/office/powerpoint/2010/main" Requires="p14">
+  <mc:AlternateContent xmlns:mc="http://schemas.openxmlformats.org/markup-compatibility/2006" xmlns:p14="http://schemas.microsoft.com/office/powerpoint/2010/main">
+    <mc:Choice Requires="p14">
       <p:transition spd="med" p14:dur="700">
         <p:fade/>
       </p:transition>
     </mc:Choice>
-    <mc:Fallback>
+    <mc:Fallback xmlns="">
       <p:transition spd="med">
         <p:fade/>
       </p:transition>
@@ -15009,13 +14993,13 @@
   <p:clrMapOvr>
     <a:masterClrMapping/>
   </p:clrMapOvr>
-  <mc:AlternateContent xmlns:mc="http://schemas.openxmlformats.org/markup-compatibility/2006">
-    <mc:Choice xmlns:p14="http://schemas.microsoft.com/office/powerpoint/2010/main" Requires="p14">
+  <mc:AlternateContent xmlns:mc="http://schemas.openxmlformats.org/markup-compatibility/2006" xmlns:p14="http://schemas.microsoft.com/office/powerpoint/2010/main">
+    <mc:Choice Requires="p14">
       <p:transition spd="med" p14:dur="700">
         <p:fade/>
       </p:transition>
     </mc:Choice>
-    <mc:Fallback>
+    <mc:Fallback xmlns="">
       <p:transition spd="med">
         <p:fade/>
       </p:transition>

</xml_diff>